<commit_message>
pictures has been updated
</commit_message>
<xml_diff>
--- a/Springer_UAV_book/Pictures/Fig10.pptx
+++ b/Springer_UAV_book/Pictures/Fig10.pptx
@@ -5,8 +5,7 @@
     <p:sldMasterId id="2147483648" r:id="rId1"/>
   </p:sldMasterIdLst>
   <p:sldIdLst>
-    <p:sldId id="258" r:id="rId2"/>
-    <p:sldId id="259" r:id="rId3"/>
+    <p:sldId id="259" r:id="rId2"/>
   </p:sldIdLst>
   <p:sldSz cx="9144000" cy="6858000" type="screen4x3"/>
   <p:notesSz cx="6858000" cy="9144000"/>
@@ -290,7 +289,7 @@
             <a:fld id="{CC7BA875-E63D-46CD-9D74-6CBD955FEC8C}" type="datetimeFigureOut">
               <a:rPr lang="en-US" smtClean="0"/>
               <a:pPr/>
-              <a:t>4/14/2012</a:t>
+              <a:t>4/16/2012</a:t>
             </a:fld>
             <a:endParaRPr lang="en-US"/>
           </a:p>
@@ -457,7 +456,7 @@
             <a:fld id="{CC7BA875-E63D-46CD-9D74-6CBD955FEC8C}" type="datetimeFigureOut">
               <a:rPr lang="en-US" smtClean="0"/>
               <a:pPr/>
-              <a:t>4/14/2012</a:t>
+              <a:t>4/16/2012</a:t>
             </a:fld>
             <a:endParaRPr lang="en-US"/>
           </a:p>
@@ -634,7 +633,7 @@
             <a:fld id="{CC7BA875-E63D-46CD-9D74-6CBD955FEC8C}" type="datetimeFigureOut">
               <a:rPr lang="en-US" smtClean="0"/>
               <a:pPr/>
-              <a:t>4/14/2012</a:t>
+              <a:t>4/16/2012</a:t>
             </a:fld>
             <a:endParaRPr lang="en-US"/>
           </a:p>
@@ -801,7 +800,7 @@
             <a:fld id="{CC7BA875-E63D-46CD-9D74-6CBD955FEC8C}" type="datetimeFigureOut">
               <a:rPr lang="en-US" smtClean="0"/>
               <a:pPr/>
-              <a:t>4/14/2012</a:t>
+              <a:t>4/16/2012</a:t>
             </a:fld>
             <a:endParaRPr lang="en-US"/>
           </a:p>
@@ -1044,7 +1043,7 @@
             <a:fld id="{CC7BA875-E63D-46CD-9D74-6CBD955FEC8C}" type="datetimeFigureOut">
               <a:rPr lang="en-US" smtClean="0"/>
               <a:pPr/>
-              <a:t>4/14/2012</a:t>
+              <a:t>4/16/2012</a:t>
             </a:fld>
             <a:endParaRPr lang="en-US"/>
           </a:p>
@@ -1329,7 +1328,7 @@
             <a:fld id="{CC7BA875-E63D-46CD-9D74-6CBD955FEC8C}" type="datetimeFigureOut">
               <a:rPr lang="en-US" smtClean="0"/>
               <a:pPr/>
-              <a:t>4/14/2012</a:t>
+              <a:t>4/16/2012</a:t>
             </a:fld>
             <a:endParaRPr lang="en-US"/>
           </a:p>
@@ -1748,7 +1747,7 @@
             <a:fld id="{CC7BA875-E63D-46CD-9D74-6CBD955FEC8C}" type="datetimeFigureOut">
               <a:rPr lang="en-US" smtClean="0"/>
               <a:pPr/>
-              <a:t>4/14/2012</a:t>
+              <a:t>4/16/2012</a:t>
             </a:fld>
             <a:endParaRPr lang="en-US"/>
           </a:p>
@@ -1863,7 +1862,7 @@
             <a:fld id="{CC7BA875-E63D-46CD-9D74-6CBD955FEC8C}" type="datetimeFigureOut">
               <a:rPr lang="en-US" smtClean="0"/>
               <a:pPr/>
-              <a:t>4/14/2012</a:t>
+              <a:t>4/16/2012</a:t>
             </a:fld>
             <a:endParaRPr lang="en-US"/>
           </a:p>
@@ -1955,7 +1954,7 @@
             <a:fld id="{CC7BA875-E63D-46CD-9D74-6CBD955FEC8C}" type="datetimeFigureOut">
               <a:rPr lang="en-US" smtClean="0"/>
               <a:pPr/>
-              <a:t>4/14/2012</a:t>
+              <a:t>4/16/2012</a:t>
             </a:fld>
             <a:endParaRPr lang="en-US"/>
           </a:p>
@@ -2229,7 +2228,7 @@
             <a:fld id="{CC7BA875-E63D-46CD-9D74-6CBD955FEC8C}" type="datetimeFigureOut">
               <a:rPr lang="en-US" smtClean="0"/>
               <a:pPr/>
-              <a:t>4/14/2012</a:t>
+              <a:t>4/16/2012</a:t>
             </a:fld>
             <a:endParaRPr lang="en-US"/>
           </a:p>
@@ -2479,7 +2478,7 @@
             <a:fld id="{CC7BA875-E63D-46CD-9D74-6CBD955FEC8C}" type="datetimeFigureOut">
               <a:rPr lang="en-US" smtClean="0"/>
               <a:pPr/>
-              <a:t>4/14/2012</a:t>
+              <a:t>4/16/2012</a:t>
             </a:fld>
             <a:endParaRPr lang="en-US"/>
           </a:p>
@@ -2689,7 +2688,7 @@
             <a:fld id="{CC7BA875-E63D-46CD-9D74-6CBD955FEC8C}" type="datetimeFigureOut">
               <a:rPr lang="en-US" smtClean="0"/>
               <a:pPr/>
-              <a:t>4/14/2012</a:t>
+              <a:t>4/16/2012</a:t>
             </a:fld>
             <a:endParaRPr lang="en-US"/>
           </a:p>
@@ -3044,1320 +3043,6 @@
 </file>
 
 <file path=ppt/slides/slide1.xml><?xml version="1.0" encoding="utf-8"?>
-<p:sld xmlns:a="http://schemas.openxmlformats.org/drawingml/2006/main" xmlns:r="http://schemas.openxmlformats.org/officeDocument/2006/relationships" xmlns:p="http://schemas.openxmlformats.org/presentationml/2006/main">
-  <p:cSld>
-    <p:spTree>
-      <p:nvGrpSpPr>
-        <p:cNvPr id="1" name=""/>
-        <p:cNvGrpSpPr/>
-        <p:nvPr/>
-      </p:nvGrpSpPr>
-      <p:grpSpPr>
-        <a:xfrm>
-          <a:off x="0" y="0"/>
-          <a:ext cx="0" cy="0"/>
-          <a:chOff x="0" y="0"/>
-          <a:chExt cx="0" cy="0"/>
-        </a:xfrm>
-      </p:grpSpPr>
-      <p:sp>
-        <p:nvSpPr>
-          <p:cNvPr id="59" name="Freeform 58"/>
-          <p:cNvSpPr/>
-          <p:nvPr/>
-        </p:nvSpPr>
-        <p:spPr>
-          <a:xfrm>
-            <a:off x="3918479" y="3134253"/>
-            <a:ext cx="2088092" cy="973667"/>
-          </a:xfrm>
-          <a:custGeom>
-            <a:avLst/>
-            <a:gdLst>
-              <a:gd name="connsiteX0" fmla="*/ 2646 w 2243667"/>
-              <a:gd name="connsiteY0" fmla="*/ 50271 h 1008592"/>
-              <a:gd name="connsiteX1" fmla="*/ 43921 w 2243667"/>
-              <a:gd name="connsiteY1" fmla="*/ 15346 h 1008592"/>
-              <a:gd name="connsiteX2" fmla="*/ 139171 w 2243667"/>
-              <a:gd name="connsiteY2" fmla="*/ 2646 h 1008592"/>
-              <a:gd name="connsiteX3" fmla="*/ 316971 w 2243667"/>
-              <a:gd name="connsiteY3" fmla="*/ 31221 h 1008592"/>
-              <a:gd name="connsiteX4" fmla="*/ 659871 w 2243667"/>
-              <a:gd name="connsiteY4" fmla="*/ 142346 h 1008592"/>
-              <a:gd name="connsiteX5" fmla="*/ 951971 w 2243667"/>
-              <a:gd name="connsiteY5" fmla="*/ 269346 h 1008592"/>
-              <a:gd name="connsiteX6" fmla="*/ 1282171 w 2243667"/>
-              <a:gd name="connsiteY6" fmla="*/ 434446 h 1008592"/>
-              <a:gd name="connsiteX7" fmla="*/ 1621896 w 2243667"/>
-              <a:gd name="connsiteY7" fmla="*/ 631296 h 1008592"/>
-              <a:gd name="connsiteX8" fmla="*/ 1863196 w 2243667"/>
-              <a:gd name="connsiteY8" fmla="*/ 786871 h 1008592"/>
-              <a:gd name="connsiteX9" fmla="*/ 2012421 w 2243667"/>
-              <a:gd name="connsiteY9" fmla="*/ 897996 h 1008592"/>
-              <a:gd name="connsiteX10" fmla="*/ 2085446 w 2243667"/>
-              <a:gd name="connsiteY10" fmla="*/ 961496 h 1008592"/>
-              <a:gd name="connsiteX11" fmla="*/ 1063096 w 2243667"/>
-              <a:gd name="connsiteY11" fmla="*/ 615421 h 1008592"/>
-              <a:gd name="connsiteX12" fmla="*/ 529696 w 2243667"/>
-              <a:gd name="connsiteY12" fmla="*/ 386821 h 1008592"/>
-              <a:gd name="connsiteX13" fmla="*/ 148696 w 2243667"/>
-              <a:gd name="connsiteY13" fmla="*/ 199496 h 1008592"/>
-              <a:gd name="connsiteX14" fmla="*/ 28046 w 2243667"/>
-              <a:gd name="connsiteY14" fmla="*/ 120121 h 1008592"/>
-              <a:gd name="connsiteX15" fmla="*/ 2646 w 2243667"/>
-              <a:gd name="connsiteY15" fmla="*/ 50271 h 1008592"/>
-              <a:gd name="connsiteX0" fmla="*/ 2646 w 2199217"/>
-              <a:gd name="connsiteY0" fmla="*/ 50271 h 1002242"/>
-              <a:gd name="connsiteX1" fmla="*/ 43921 w 2199217"/>
-              <a:gd name="connsiteY1" fmla="*/ 15346 h 1002242"/>
-              <a:gd name="connsiteX2" fmla="*/ 139171 w 2199217"/>
-              <a:gd name="connsiteY2" fmla="*/ 2646 h 1002242"/>
-              <a:gd name="connsiteX3" fmla="*/ 316971 w 2199217"/>
-              <a:gd name="connsiteY3" fmla="*/ 31221 h 1002242"/>
-              <a:gd name="connsiteX4" fmla="*/ 659871 w 2199217"/>
-              <a:gd name="connsiteY4" fmla="*/ 142346 h 1002242"/>
-              <a:gd name="connsiteX5" fmla="*/ 951971 w 2199217"/>
-              <a:gd name="connsiteY5" fmla="*/ 269346 h 1002242"/>
-              <a:gd name="connsiteX6" fmla="*/ 1282171 w 2199217"/>
-              <a:gd name="connsiteY6" fmla="*/ 434446 h 1002242"/>
-              <a:gd name="connsiteX7" fmla="*/ 1621896 w 2199217"/>
-              <a:gd name="connsiteY7" fmla="*/ 631296 h 1002242"/>
-              <a:gd name="connsiteX8" fmla="*/ 1863196 w 2199217"/>
-              <a:gd name="connsiteY8" fmla="*/ 786871 h 1002242"/>
-              <a:gd name="connsiteX9" fmla="*/ 2012421 w 2199217"/>
-              <a:gd name="connsiteY9" fmla="*/ 897996 h 1002242"/>
-              <a:gd name="connsiteX10" fmla="*/ 2040996 w 2199217"/>
-              <a:gd name="connsiteY10" fmla="*/ 955146 h 1002242"/>
-              <a:gd name="connsiteX11" fmla="*/ 1063096 w 2199217"/>
-              <a:gd name="connsiteY11" fmla="*/ 615421 h 1002242"/>
-              <a:gd name="connsiteX12" fmla="*/ 529696 w 2199217"/>
-              <a:gd name="connsiteY12" fmla="*/ 386821 h 1002242"/>
-              <a:gd name="connsiteX13" fmla="*/ 148696 w 2199217"/>
-              <a:gd name="connsiteY13" fmla="*/ 199496 h 1002242"/>
-              <a:gd name="connsiteX14" fmla="*/ 28046 w 2199217"/>
-              <a:gd name="connsiteY14" fmla="*/ 120121 h 1002242"/>
-              <a:gd name="connsiteX15" fmla="*/ 2646 w 2199217"/>
-              <a:gd name="connsiteY15" fmla="*/ 50271 h 1002242"/>
-              <a:gd name="connsiteX0" fmla="*/ 2646 w 2088092"/>
-              <a:gd name="connsiteY0" fmla="*/ 50271 h 973667"/>
-              <a:gd name="connsiteX1" fmla="*/ 43921 w 2088092"/>
-              <a:gd name="connsiteY1" fmla="*/ 15346 h 973667"/>
-              <a:gd name="connsiteX2" fmla="*/ 139171 w 2088092"/>
-              <a:gd name="connsiteY2" fmla="*/ 2646 h 973667"/>
-              <a:gd name="connsiteX3" fmla="*/ 316971 w 2088092"/>
-              <a:gd name="connsiteY3" fmla="*/ 31221 h 973667"/>
-              <a:gd name="connsiteX4" fmla="*/ 659871 w 2088092"/>
-              <a:gd name="connsiteY4" fmla="*/ 142346 h 973667"/>
-              <a:gd name="connsiteX5" fmla="*/ 951971 w 2088092"/>
-              <a:gd name="connsiteY5" fmla="*/ 269346 h 973667"/>
-              <a:gd name="connsiteX6" fmla="*/ 1282171 w 2088092"/>
-              <a:gd name="connsiteY6" fmla="*/ 434446 h 973667"/>
-              <a:gd name="connsiteX7" fmla="*/ 1621896 w 2088092"/>
-              <a:gd name="connsiteY7" fmla="*/ 631296 h 973667"/>
-              <a:gd name="connsiteX8" fmla="*/ 1863196 w 2088092"/>
-              <a:gd name="connsiteY8" fmla="*/ 786871 h 973667"/>
-              <a:gd name="connsiteX9" fmla="*/ 2012421 w 2088092"/>
-              <a:gd name="connsiteY9" fmla="*/ 897996 h 973667"/>
-              <a:gd name="connsiteX10" fmla="*/ 2040996 w 2088092"/>
-              <a:gd name="connsiteY10" fmla="*/ 955146 h 973667"/>
-              <a:gd name="connsiteX11" fmla="*/ 1063096 w 2088092"/>
-              <a:gd name="connsiteY11" fmla="*/ 615421 h 973667"/>
-              <a:gd name="connsiteX12" fmla="*/ 529696 w 2088092"/>
-              <a:gd name="connsiteY12" fmla="*/ 386821 h 973667"/>
-              <a:gd name="connsiteX13" fmla="*/ 148696 w 2088092"/>
-              <a:gd name="connsiteY13" fmla="*/ 199496 h 973667"/>
-              <a:gd name="connsiteX14" fmla="*/ 28046 w 2088092"/>
-              <a:gd name="connsiteY14" fmla="*/ 120121 h 973667"/>
-              <a:gd name="connsiteX15" fmla="*/ 2646 w 2088092"/>
-              <a:gd name="connsiteY15" fmla="*/ 50271 h 973667"/>
-            </a:gdLst>
-            <a:ahLst/>
-            <a:cxnLst>
-              <a:cxn ang="0">
-                <a:pos x="connsiteX0" y="connsiteY0"/>
-              </a:cxn>
-              <a:cxn ang="0">
-                <a:pos x="connsiteX1" y="connsiteY1"/>
-              </a:cxn>
-              <a:cxn ang="0">
-                <a:pos x="connsiteX2" y="connsiteY2"/>
-              </a:cxn>
-              <a:cxn ang="0">
-                <a:pos x="connsiteX3" y="connsiteY3"/>
-              </a:cxn>
-              <a:cxn ang="0">
-                <a:pos x="connsiteX4" y="connsiteY4"/>
-              </a:cxn>
-              <a:cxn ang="0">
-                <a:pos x="connsiteX5" y="connsiteY5"/>
-              </a:cxn>
-              <a:cxn ang="0">
-                <a:pos x="connsiteX6" y="connsiteY6"/>
-              </a:cxn>
-              <a:cxn ang="0">
-                <a:pos x="connsiteX7" y="connsiteY7"/>
-              </a:cxn>
-              <a:cxn ang="0">
-                <a:pos x="connsiteX8" y="connsiteY8"/>
-              </a:cxn>
-              <a:cxn ang="0">
-                <a:pos x="connsiteX9" y="connsiteY9"/>
-              </a:cxn>
-              <a:cxn ang="0">
-                <a:pos x="connsiteX10" y="connsiteY10"/>
-              </a:cxn>
-              <a:cxn ang="0">
-                <a:pos x="connsiteX11" y="connsiteY11"/>
-              </a:cxn>
-              <a:cxn ang="0">
-                <a:pos x="connsiteX12" y="connsiteY12"/>
-              </a:cxn>
-              <a:cxn ang="0">
-                <a:pos x="connsiteX13" y="connsiteY13"/>
-              </a:cxn>
-              <a:cxn ang="0">
-                <a:pos x="connsiteX14" y="connsiteY14"/>
-              </a:cxn>
-              <a:cxn ang="0">
-                <a:pos x="connsiteX15" y="connsiteY15"/>
-              </a:cxn>
-            </a:cxnLst>
-            <a:rect l="l" t="t" r="r" b="b"/>
-            <a:pathLst>
-              <a:path w="2088092" h="973667">
-                <a:moveTo>
-                  <a:pt x="2646" y="50271"/>
-                </a:moveTo>
-                <a:cubicBezTo>
-                  <a:pt x="5292" y="32808"/>
-                  <a:pt x="21167" y="23284"/>
-                  <a:pt x="43921" y="15346"/>
-                </a:cubicBezTo>
-                <a:cubicBezTo>
-                  <a:pt x="66675" y="7409"/>
-                  <a:pt x="93663" y="0"/>
-                  <a:pt x="139171" y="2646"/>
-                </a:cubicBezTo>
-                <a:cubicBezTo>
-                  <a:pt x="184679" y="5292"/>
-                  <a:pt x="230188" y="7938"/>
-                  <a:pt x="316971" y="31221"/>
-                </a:cubicBezTo>
-                <a:cubicBezTo>
-                  <a:pt x="403754" y="54504"/>
-                  <a:pt x="554038" y="102659"/>
-                  <a:pt x="659871" y="142346"/>
-                </a:cubicBezTo>
-                <a:cubicBezTo>
-                  <a:pt x="765704" y="182034"/>
-                  <a:pt x="848254" y="220663"/>
-                  <a:pt x="951971" y="269346"/>
-                </a:cubicBezTo>
-                <a:cubicBezTo>
-                  <a:pt x="1055688" y="318029"/>
-                  <a:pt x="1170517" y="374121"/>
-                  <a:pt x="1282171" y="434446"/>
-                </a:cubicBezTo>
-                <a:cubicBezTo>
-                  <a:pt x="1393825" y="494771"/>
-                  <a:pt x="1525059" y="572559"/>
-                  <a:pt x="1621896" y="631296"/>
-                </a:cubicBezTo>
-                <a:cubicBezTo>
-                  <a:pt x="1718733" y="690033"/>
-                  <a:pt x="1798109" y="742421"/>
-                  <a:pt x="1863196" y="786871"/>
-                </a:cubicBezTo>
-                <a:cubicBezTo>
-                  <a:pt x="1928283" y="831321"/>
-                  <a:pt x="1982788" y="869950"/>
-                  <a:pt x="2012421" y="897996"/>
-                </a:cubicBezTo>
-                <a:cubicBezTo>
-                  <a:pt x="2042054" y="926042"/>
-                  <a:pt x="2088092" y="973667"/>
-                  <a:pt x="2040996" y="955146"/>
-                </a:cubicBezTo>
-                <a:cubicBezTo>
-                  <a:pt x="1882775" y="908050"/>
-                  <a:pt x="1314979" y="710142"/>
-                  <a:pt x="1063096" y="615421"/>
-                </a:cubicBezTo>
-                <a:cubicBezTo>
-                  <a:pt x="811213" y="520700"/>
-                  <a:pt x="682096" y="456142"/>
-                  <a:pt x="529696" y="386821"/>
-                </a:cubicBezTo>
-                <a:cubicBezTo>
-                  <a:pt x="377296" y="317500"/>
-                  <a:pt x="232304" y="243946"/>
-                  <a:pt x="148696" y="199496"/>
-                </a:cubicBezTo>
-                <a:cubicBezTo>
-                  <a:pt x="65088" y="155046"/>
-                  <a:pt x="51858" y="139700"/>
-                  <a:pt x="28046" y="120121"/>
-                </a:cubicBezTo>
-                <a:cubicBezTo>
-                  <a:pt x="4234" y="100542"/>
-                  <a:pt x="0" y="67734"/>
-                  <a:pt x="2646" y="50271"/>
-                </a:cubicBezTo>
-                <a:close/>
-              </a:path>
-            </a:pathLst>
-          </a:custGeom>
-          <a:solidFill>
-            <a:schemeClr val="bg1">
-              <a:lumMod val="85000"/>
-            </a:schemeClr>
-          </a:solidFill>
-          <a:ln w="3175">
-            <a:solidFill>
-              <a:schemeClr val="tx1"/>
-            </a:solidFill>
-          </a:ln>
-        </p:spPr>
-        <p:style>
-          <a:lnRef idx="2">
-            <a:schemeClr val="accent1">
-              <a:shade val="50000"/>
-            </a:schemeClr>
-          </a:lnRef>
-          <a:fillRef idx="1">
-            <a:schemeClr val="accent1"/>
-          </a:fillRef>
-          <a:effectRef idx="0">
-            <a:schemeClr val="accent1"/>
-          </a:effectRef>
-          <a:fontRef idx="minor">
-            <a:schemeClr val="lt1"/>
-          </a:fontRef>
-        </p:style>
-        <p:txBody>
-          <a:bodyPr rtlCol="0" anchor="ctr"/>
-          <a:lstStyle/>
-          <a:p>
-            <a:pPr algn="ctr"/>
-            <a:endParaRPr lang="en-US"/>
-          </a:p>
-        </p:txBody>
-      </p:sp>
-      <p:cxnSp>
-        <p:nvCxnSpPr>
-          <p:cNvPr id="13" name="Straight Connector 12"/>
-          <p:cNvCxnSpPr>
-            <a:endCxn id="9" idx="2"/>
-          </p:cNvCxnSpPr>
-          <p:nvPr/>
-        </p:nvCxnSpPr>
-        <p:spPr>
-          <a:xfrm>
-            <a:off x="3286125" y="2905125"/>
-            <a:ext cx="2785227" cy="1221942"/>
-          </a:xfrm>
-          <a:prstGeom prst="line">
-            <a:avLst/>
-          </a:prstGeom>
-          <a:ln w="15875">
-            <a:solidFill>
-              <a:schemeClr val="tx1"/>
-            </a:solidFill>
-            <a:headEnd type="stealth"/>
-            <a:tailEnd type="none"/>
-          </a:ln>
-        </p:spPr>
-        <p:style>
-          <a:lnRef idx="1">
-            <a:schemeClr val="accent1"/>
-          </a:lnRef>
-          <a:fillRef idx="0">
-            <a:schemeClr val="accent1"/>
-          </a:fillRef>
-          <a:effectRef idx="0">
-            <a:schemeClr val="accent1"/>
-          </a:effectRef>
-          <a:fontRef idx="minor">
-            <a:schemeClr val="tx1"/>
-          </a:fontRef>
-        </p:style>
-      </p:cxnSp>
-      <p:sp>
-        <p:nvSpPr>
-          <p:cNvPr id="8" name="Arc 7"/>
-          <p:cNvSpPr/>
-          <p:nvPr/>
-        </p:nvSpPr>
-        <p:spPr>
-          <a:xfrm rot="1715337" flipH="1">
-            <a:off x="3766951" y="3542233"/>
-            <a:ext cx="2649436" cy="553704"/>
-          </a:xfrm>
-          <a:prstGeom prst="arc">
-            <a:avLst>
-              <a:gd name="adj1" fmla="val 11465008"/>
-              <a:gd name="adj2" fmla="val 0"/>
-            </a:avLst>
-          </a:prstGeom>
-          <a:ln w="15875">
-            <a:solidFill>
-              <a:schemeClr val="tx1"/>
-            </a:solidFill>
-          </a:ln>
-        </p:spPr>
-        <p:style>
-          <a:lnRef idx="1">
-            <a:schemeClr val="accent1"/>
-          </a:lnRef>
-          <a:fillRef idx="0">
-            <a:schemeClr val="accent1"/>
-          </a:fillRef>
-          <a:effectRef idx="0">
-            <a:schemeClr val="accent1"/>
-          </a:effectRef>
-          <a:fontRef idx="minor">
-            <a:schemeClr val="tx1"/>
-          </a:fontRef>
-        </p:style>
-        <p:txBody>
-          <a:bodyPr rtlCol="0" anchor="ctr"/>
-          <a:lstStyle/>
-          <a:p>
-            <a:pPr algn="ctr"/>
-            <a:endParaRPr lang="en-US"/>
-          </a:p>
-        </p:txBody>
-      </p:sp>
-      <p:sp>
-        <p:nvSpPr>
-          <p:cNvPr id="9" name="Arc 8"/>
-          <p:cNvSpPr/>
-          <p:nvPr/>
-        </p:nvSpPr>
-        <p:spPr>
-          <a:xfrm rot="1156438" flipH="1">
-            <a:off x="3824816" y="3594000"/>
-            <a:ext cx="3484349" cy="357396"/>
-          </a:xfrm>
-          <a:prstGeom prst="arc">
-            <a:avLst>
-              <a:gd name="adj1" fmla="val 21567669"/>
-              <a:gd name="adj2" fmla="val 9850899"/>
-            </a:avLst>
-          </a:prstGeom>
-          <a:ln w="15875">
-            <a:solidFill>
-              <a:schemeClr val="tx1"/>
-            </a:solidFill>
-          </a:ln>
-        </p:spPr>
-        <p:style>
-          <a:lnRef idx="1">
-            <a:schemeClr val="accent1"/>
-          </a:lnRef>
-          <a:fillRef idx="0">
-            <a:schemeClr val="accent1"/>
-          </a:fillRef>
-          <a:effectRef idx="0">
-            <a:schemeClr val="accent1"/>
-          </a:effectRef>
-          <a:fontRef idx="minor">
-            <a:schemeClr val="tx1"/>
-          </a:fontRef>
-        </p:style>
-        <p:txBody>
-          <a:bodyPr rtlCol="0" anchor="ctr"/>
-          <a:lstStyle/>
-          <a:p>
-            <a:pPr algn="ctr"/>
-            <a:endParaRPr lang="en-US"/>
-          </a:p>
-        </p:txBody>
-      </p:sp>
-      <p:cxnSp>
-        <p:nvCxnSpPr>
-          <p:cNvPr id="12" name="Straight Connector 11"/>
-          <p:cNvCxnSpPr/>
-          <p:nvPr/>
-        </p:nvCxnSpPr>
-        <p:spPr>
-          <a:xfrm>
-            <a:off x="3038475" y="3438525"/>
-            <a:ext cx="1447800" cy="0"/>
-          </a:xfrm>
-          <a:prstGeom prst="line">
-            <a:avLst/>
-          </a:prstGeom>
-          <a:ln w="15875">
-            <a:solidFill>
-              <a:schemeClr val="tx1"/>
-            </a:solidFill>
-            <a:headEnd type="stealth"/>
-            <a:tailEnd type="none"/>
-          </a:ln>
-        </p:spPr>
-        <p:style>
-          <a:lnRef idx="1">
-            <a:schemeClr val="accent1"/>
-          </a:lnRef>
-          <a:fillRef idx="0">
-            <a:schemeClr val="accent1"/>
-          </a:fillRef>
-          <a:effectRef idx="0">
-            <a:schemeClr val="accent1"/>
-          </a:effectRef>
-          <a:fontRef idx="minor">
-            <a:schemeClr val="tx1"/>
-          </a:fontRef>
-        </p:style>
-      </p:cxnSp>
-      <p:sp>
-        <p:nvSpPr>
-          <p:cNvPr id="16" name="Oval 15"/>
-          <p:cNvSpPr/>
-          <p:nvPr/>
-        </p:nvSpPr>
-        <p:spPr>
-          <a:xfrm>
-            <a:off x="4429125" y="3381375"/>
-            <a:ext cx="85725" cy="85725"/>
-          </a:xfrm>
-          <a:prstGeom prst="ellipse">
-            <a:avLst/>
-          </a:prstGeom>
-          <a:solidFill>
-            <a:schemeClr val="tx1"/>
-          </a:solidFill>
-          <a:ln w="15875">
-            <a:solidFill>
-              <a:schemeClr val="tx1"/>
-            </a:solidFill>
-          </a:ln>
-        </p:spPr>
-        <p:style>
-          <a:lnRef idx="1">
-            <a:schemeClr val="accent1"/>
-          </a:lnRef>
-          <a:fillRef idx="0">
-            <a:schemeClr val="accent1"/>
-          </a:fillRef>
-          <a:effectRef idx="0">
-            <a:schemeClr val="accent1"/>
-          </a:effectRef>
-          <a:fontRef idx="minor">
-            <a:schemeClr val="tx1"/>
-          </a:fontRef>
-        </p:style>
-        <p:txBody>
-          <a:bodyPr rtlCol="0" anchor="ctr"/>
-          <a:lstStyle/>
-          <a:p>
-            <a:pPr algn="ctr"/>
-            <a:endParaRPr lang="en-US">
-              <a:solidFill>
-                <a:schemeClr val="tx1"/>
-              </a:solidFill>
-            </a:endParaRPr>
-          </a:p>
-        </p:txBody>
-      </p:sp>
-      <p:graphicFrame>
-        <p:nvGraphicFramePr>
-          <p:cNvPr id="18" name="Object 17"/>
-          <p:cNvGraphicFramePr>
-            <a:graphicFrameLocks noChangeAspect="1"/>
-          </p:cNvGraphicFramePr>
-          <p:nvPr/>
-        </p:nvGraphicFramePr>
-        <p:xfrm>
-          <a:off x="3070225" y="2747963"/>
-          <a:ext cx="165100" cy="228600"/>
-        </p:xfrm>
-        <a:graphic>
-          <a:graphicData uri="http://schemas.openxmlformats.org/presentationml/2006/ole">
-            <p:oleObj spid="_x0000_s15362" name="Equation" r:id="rId3" imgW="164880" imgH="228600" progId="Equation.DSMT4">
-              <p:embed/>
-            </p:oleObj>
-          </a:graphicData>
-        </a:graphic>
-      </p:graphicFrame>
-      <p:graphicFrame>
-        <p:nvGraphicFramePr>
-          <p:cNvPr id="15363" name="Object 3"/>
-          <p:cNvGraphicFramePr>
-            <a:graphicFrameLocks noChangeAspect="1"/>
-          </p:cNvGraphicFramePr>
-          <p:nvPr/>
-        </p:nvGraphicFramePr>
-        <p:xfrm>
-          <a:off x="3322637" y="3481388"/>
-          <a:ext cx="203200" cy="228600"/>
-        </p:xfrm>
-        <a:graphic>
-          <a:graphicData uri="http://schemas.openxmlformats.org/presentationml/2006/ole">
-            <p:oleObj spid="_x0000_s15363" name="Equation" r:id="rId4" imgW="203040" imgH="228600" progId="Equation.DSMT4">
-              <p:embed/>
-            </p:oleObj>
-          </a:graphicData>
-        </a:graphic>
-      </p:graphicFrame>
-      <p:graphicFrame>
-        <p:nvGraphicFramePr>
-          <p:cNvPr id="15364" name="Object 4"/>
-          <p:cNvGraphicFramePr>
-            <a:graphicFrameLocks noChangeAspect="1"/>
-          </p:cNvGraphicFramePr>
-          <p:nvPr/>
-        </p:nvGraphicFramePr>
-        <p:xfrm>
-          <a:off x="3001962" y="3400425"/>
-          <a:ext cx="177800" cy="228600"/>
-        </p:xfrm>
-        <a:graphic>
-          <a:graphicData uri="http://schemas.openxmlformats.org/presentationml/2006/ole">
-            <p:oleObj spid="_x0000_s15364" name="Equation" r:id="rId5" imgW="177480" imgH="228600" progId="Equation.DSMT4">
-              <p:embed/>
-            </p:oleObj>
-          </a:graphicData>
-        </a:graphic>
-      </p:graphicFrame>
-      <p:sp>
-        <p:nvSpPr>
-          <p:cNvPr id="19" name="Arc 18"/>
-          <p:cNvSpPr/>
-          <p:nvPr/>
-        </p:nvSpPr>
-        <p:spPr>
-          <a:xfrm>
-            <a:off x="3400424" y="2381249"/>
-            <a:ext cx="2105025" cy="2105025"/>
-          </a:xfrm>
-          <a:prstGeom prst="arc">
-            <a:avLst>
-              <a:gd name="adj1" fmla="val 10784910"/>
-              <a:gd name="adj2" fmla="val 12296160"/>
-            </a:avLst>
-          </a:prstGeom>
-          <a:ln w="15875">
-            <a:solidFill>
-              <a:schemeClr val="tx1"/>
-            </a:solidFill>
-            <a:tailEnd type="stealth"/>
-          </a:ln>
-        </p:spPr>
-        <p:style>
-          <a:lnRef idx="1">
-            <a:schemeClr val="accent1"/>
-          </a:lnRef>
-          <a:fillRef idx="0">
-            <a:schemeClr val="accent1"/>
-          </a:fillRef>
-          <a:effectRef idx="0">
-            <a:schemeClr val="accent1"/>
-          </a:effectRef>
-          <a:fontRef idx="minor">
-            <a:schemeClr val="tx1"/>
-          </a:fontRef>
-        </p:style>
-        <p:txBody>
-          <a:bodyPr rtlCol="0" anchor="ctr"/>
-          <a:lstStyle/>
-          <a:p>
-            <a:pPr algn="ctr"/>
-            <a:endParaRPr lang="en-US"/>
-          </a:p>
-        </p:txBody>
-      </p:sp>
-      <p:graphicFrame>
-        <p:nvGraphicFramePr>
-          <p:cNvPr id="15365" name="Object 5"/>
-          <p:cNvGraphicFramePr>
-            <a:graphicFrameLocks noChangeAspect="1"/>
-          </p:cNvGraphicFramePr>
-          <p:nvPr/>
-        </p:nvGraphicFramePr>
-        <p:xfrm>
-          <a:off x="3200400" y="3135313"/>
-          <a:ext cx="152400" cy="139700"/>
-        </p:xfrm>
-        <a:graphic>
-          <a:graphicData uri="http://schemas.openxmlformats.org/presentationml/2006/ole">
-            <p:oleObj spid="_x0000_s15365" name="Equation" r:id="rId6" imgW="152280" imgH="139680" progId="Equation.DSMT4">
-              <p:embed/>
-            </p:oleObj>
-          </a:graphicData>
-        </a:graphic>
-      </p:graphicFrame>
-      <p:cxnSp>
-        <p:nvCxnSpPr>
-          <p:cNvPr id="21" name="Straight Connector 20"/>
-          <p:cNvCxnSpPr>
-            <a:endCxn id="16" idx="3"/>
-          </p:cNvCxnSpPr>
-          <p:nvPr/>
-        </p:nvCxnSpPr>
-        <p:spPr>
-          <a:xfrm flipV="1">
-            <a:off x="4080435" y="3454546"/>
-            <a:ext cx="361244" cy="826942"/>
-          </a:xfrm>
-          <a:prstGeom prst="line">
-            <a:avLst/>
-          </a:prstGeom>
-          <a:ln w="15875">
-            <a:solidFill>
-              <a:schemeClr val="tx1"/>
-            </a:solidFill>
-            <a:headEnd type="stealth"/>
-            <a:tailEnd type="none"/>
-          </a:ln>
-        </p:spPr>
-        <p:style>
-          <a:lnRef idx="1">
-            <a:schemeClr val="accent1"/>
-          </a:lnRef>
-          <a:fillRef idx="0">
-            <a:schemeClr val="accent1"/>
-          </a:fillRef>
-          <a:effectRef idx="0">
-            <a:schemeClr val="accent1"/>
-          </a:effectRef>
-          <a:fontRef idx="minor">
-            <a:schemeClr val="tx1"/>
-          </a:fontRef>
-        </p:style>
-      </p:cxnSp>
-      <p:graphicFrame>
-        <p:nvGraphicFramePr>
-          <p:cNvPr id="15366" name="Object 6"/>
-          <p:cNvGraphicFramePr>
-            <a:graphicFrameLocks noChangeAspect="1"/>
-          </p:cNvGraphicFramePr>
-          <p:nvPr/>
-        </p:nvGraphicFramePr>
-        <p:xfrm>
-          <a:off x="5172075" y="2533650"/>
-          <a:ext cx="190500" cy="228600"/>
-        </p:xfrm>
-        <a:graphic>
-          <a:graphicData uri="http://schemas.openxmlformats.org/presentationml/2006/ole">
-            <p:oleObj spid="_x0000_s15366" name="Equation" r:id="rId7" imgW="190440" imgH="228600" progId="Equation.DSMT4">
-              <p:embed/>
-            </p:oleObj>
-          </a:graphicData>
-        </a:graphic>
-      </p:graphicFrame>
-      <p:cxnSp>
-        <p:nvCxnSpPr>
-          <p:cNvPr id="29" name="Straight Connector 28"/>
-          <p:cNvCxnSpPr/>
-          <p:nvPr/>
-        </p:nvCxnSpPr>
-        <p:spPr>
-          <a:xfrm flipH="1">
-            <a:off x="4470254" y="2533650"/>
-            <a:ext cx="1734" cy="897084"/>
-          </a:xfrm>
-          <a:prstGeom prst="line">
-            <a:avLst/>
-          </a:prstGeom>
-          <a:ln w="15875">
-            <a:solidFill>
-              <a:schemeClr val="tx1"/>
-            </a:solidFill>
-            <a:headEnd type="stealth"/>
-            <a:tailEnd type="none"/>
-          </a:ln>
-        </p:spPr>
-        <p:style>
-          <a:lnRef idx="1">
-            <a:schemeClr val="accent1"/>
-          </a:lnRef>
-          <a:fillRef idx="0">
-            <a:schemeClr val="accent1"/>
-          </a:fillRef>
-          <a:effectRef idx="0">
-            <a:schemeClr val="accent1"/>
-          </a:effectRef>
-          <a:fontRef idx="minor">
-            <a:schemeClr val="tx1"/>
-          </a:fontRef>
-        </p:style>
-      </p:cxnSp>
-      <p:cxnSp>
-        <p:nvCxnSpPr>
-          <p:cNvPr id="32" name="Straight Connector 31"/>
-          <p:cNvCxnSpPr>
-            <a:endCxn id="16" idx="6"/>
-          </p:cNvCxnSpPr>
-          <p:nvPr/>
-        </p:nvCxnSpPr>
-        <p:spPr>
-          <a:xfrm flipH="1">
-            <a:off x="4514850" y="3424238"/>
-            <a:ext cx="628650" cy="0"/>
-          </a:xfrm>
-          <a:prstGeom prst="line">
-            <a:avLst/>
-          </a:prstGeom>
-          <a:ln w="15875">
-            <a:solidFill>
-              <a:schemeClr val="tx1"/>
-            </a:solidFill>
-            <a:headEnd type="stealth"/>
-            <a:tailEnd type="none"/>
-          </a:ln>
-        </p:spPr>
-        <p:style>
-          <a:lnRef idx="1">
-            <a:schemeClr val="accent1"/>
-          </a:lnRef>
-          <a:fillRef idx="0">
-            <a:schemeClr val="accent1"/>
-          </a:fillRef>
-          <a:effectRef idx="0">
-            <a:schemeClr val="accent1"/>
-          </a:effectRef>
-          <a:fontRef idx="minor">
-            <a:schemeClr val="tx1"/>
-          </a:fontRef>
-        </p:style>
-      </p:cxnSp>
-      <p:sp>
-        <p:nvSpPr>
-          <p:cNvPr id="37" name="Rectangle 36"/>
-          <p:cNvSpPr/>
-          <p:nvPr/>
-        </p:nvSpPr>
-        <p:spPr>
-          <a:xfrm>
-            <a:off x="4474161" y="2547938"/>
-            <a:ext cx="674102" cy="876335"/>
-          </a:xfrm>
-          <a:prstGeom prst="rect">
-            <a:avLst/>
-          </a:prstGeom>
-          <a:ln w="9525">
-            <a:solidFill>
-              <a:schemeClr val="tx1"/>
-            </a:solidFill>
-            <a:prstDash val="dash"/>
-          </a:ln>
-        </p:spPr>
-        <p:style>
-          <a:lnRef idx="1">
-            <a:schemeClr val="accent1"/>
-          </a:lnRef>
-          <a:fillRef idx="0">
-            <a:schemeClr val="accent1"/>
-          </a:fillRef>
-          <a:effectRef idx="0">
-            <a:schemeClr val="accent1"/>
-          </a:effectRef>
-          <a:fontRef idx="minor">
-            <a:schemeClr val="tx1"/>
-          </a:fontRef>
-        </p:style>
-        <p:txBody>
-          <a:bodyPr rtlCol="0" anchor="ctr"/>
-          <a:lstStyle/>
-          <a:p>
-            <a:pPr algn="ctr"/>
-            <a:endParaRPr lang="en-US">
-              <a:solidFill>
-                <a:schemeClr val="tx1"/>
-              </a:solidFill>
-            </a:endParaRPr>
-          </a:p>
-        </p:txBody>
-      </p:sp>
-      <p:cxnSp>
-        <p:nvCxnSpPr>
-          <p:cNvPr id="38" name="Straight Connector 37"/>
-          <p:cNvCxnSpPr>
-            <a:endCxn id="16" idx="7"/>
-          </p:cNvCxnSpPr>
-          <p:nvPr/>
-        </p:nvCxnSpPr>
-        <p:spPr>
-          <a:xfrm flipH="1">
-            <a:off x="4502296" y="2547938"/>
-            <a:ext cx="641204" cy="845991"/>
-          </a:xfrm>
-          <a:prstGeom prst="line">
-            <a:avLst/>
-          </a:prstGeom>
-          <a:ln w="25400">
-            <a:solidFill>
-              <a:schemeClr val="tx1"/>
-            </a:solidFill>
-            <a:headEnd type="stealth"/>
-            <a:tailEnd type="none"/>
-          </a:ln>
-        </p:spPr>
-        <p:style>
-          <a:lnRef idx="1">
-            <a:schemeClr val="accent1"/>
-          </a:lnRef>
-          <a:fillRef idx="0">
-            <a:schemeClr val="accent1"/>
-          </a:fillRef>
-          <a:effectRef idx="0">
-            <a:schemeClr val="accent1"/>
-          </a:effectRef>
-          <a:fontRef idx="minor">
-            <a:schemeClr val="tx1"/>
-          </a:fontRef>
-        </p:style>
-      </p:cxnSp>
-      <p:graphicFrame>
-        <p:nvGraphicFramePr>
-          <p:cNvPr id="15367" name="Object 7"/>
-          <p:cNvGraphicFramePr>
-            <a:graphicFrameLocks noChangeAspect="1"/>
-          </p:cNvGraphicFramePr>
-          <p:nvPr/>
-        </p:nvGraphicFramePr>
-        <p:xfrm>
-          <a:off x="4203700" y="2541588"/>
-          <a:ext cx="241300" cy="241300"/>
-        </p:xfrm>
-        <a:graphic>
-          <a:graphicData uri="http://schemas.openxmlformats.org/presentationml/2006/ole">
-            <p:oleObj spid="_x0000_s15367" name="Equation" r:id="rId8" imgW="241200" imgH="241200" progId="Equation.DSMT4">
-              <p:embed/>
-            </p:oleObj>
-          </a:graphicData>
-        </a:graphic>
-      </p:graphicFrame>
-      <p:graphicFrame>
-        <p:nvGraphicFramePr>
-          <p:cNvPr id="43" name="Object 7"/>
-          <p:cNvGraphicFramePr>
-            <a:graphicFrameLocks noChangeAspect="1"/>
-          </p:cNvGraphicFramePr>
-          <p:nvPr/>
-        </p:nvGraphicFramePr>
-        <p:xfrm>
-          <a:off x="5138738" y="3179763"/>
-          <a:ext cx="304800" cy="241300"/>
-        </p:xfrm>
-        <a:graphic>
-          <a:graphicData uri="http://schemas.openxmlformats.org/presentationml/2006/ole">
-            <p:oleObj spid="_x0000_s15368" name="Equation" r:id="rId9" imgW="304560" imgH="241200" progId="Equation.DSMT4">
-              <p:embed/>
-            </p:oleObj>
-          </a:graphicData>
-        </a:graphic>
-      </p:graphicFrame>
-      <p:sp>
-        <p:nvSpPr>
-          <p:cNvPr id="44" name="Arc 43"/>
-          <p:cNvSpPr/>
-          <p:nvPr/>
-        </p:nvSpPr>
-        <p:spPr>
-          <a:xfrm>
-            <a:off x="4124325" y="3011598"/>
-            <a:ext cx="761999" cy="726965"/>
-          </a:xfrm>
-          <a:prstGeom prst="arc">
-            <a:avLst>
-              <a:gd name="adj1" fmla="val 3979621"/>
-              <a:gd name="adj2" fmla="val 17637570"/>
-            </a:avLst>
-          </a:prstGeom>
-          <a:ln w="25400">
-            <a:solidFill>
-              <a:schemeClr val="tx1"/>
-            </a:solidFill>
-            <a:headEnd type="none"/>
-            <a:tailEnd type="stealth"/>
-          </a:ln>
-        </p:spPr>
-        <p:style>
-          <a:lnRef idx="1">
-            <a:schemeClr val="accent1"/>
-          </a:lnRef>
-          <a:fillRef idx="0">
-            <a:schemeClr val="accent1"/>
-          </a:fillRef>
-          <a:effectRef idx="0">
-            <a:schemeClr val="accent1"/>
-          </a:effectRef>
-          <a:fontRef idx="minor">
-            <a:schemeClr val="tx1"/>
-          </a:fontRef>
-        </p:style>
-        <p:txBody>
-          <a:bodyPr rtlCol="0" anchor="ctr"/>
-          <a:lstStyle/>
-          <a:p>
-            <a:pPr algn="ctr"/>
-            <a:endParaRPr lang="en-US"/>
-          </a:p>
-        </p:txBody>
-      </p:sp>
-      <p:graphicFrame>
-        <p:nvGraphicFramePr>
-          <p:cNvPr id="45" name="Object 6"/>
-          <p:cNvGraphicFramePr>
-            <a:graphicFrameLocks noChangeAspect="1"/>
-          </p:cNvGraphicFramePr>
-          <p:nvPr/>
-        </p:nvGraphicFramePr>
-        <p:xfrm>
-          <a:off x="4546600" y="2779713"/>
-          <a:ext cx="203200" cy="241300"/>
-        </p:xfrm>
-        <a:graphic>
-          <a:graphicData uri="http://schemas.openxmlformats.org/presentationml/2006/ole">
-            <p:oleObj spid="_x0000_s15369" name="Equation" r:id="rId10" imgW="203040" imgH="241200" progId="Equation.DSMT4">
-              <p:embed/>
-            </p:oleObj>
-          </a:graphicData>
-        </a:graphic>
-      </p:graphicFrame>
-      <p:graphicFrame>
-        <p:nvGraphicFramePr>
-          <p:cNvPr id="15370" name="Object 10"/>
-          <p:cNvGraphicFramePr>
-            <a:graphicFrameLocks noChangeAspect="1"/>
-          </p:cNvGraphicFramePr>
-          <p:nvPr/>
-        </p:nvGraphicFramePr>
-        <p:xfrm>
-          <a:off x="3889375" y="4052888"/>
-          <a:ext cx="165100" cy="228600"/>
-        </p:xfrm>
-        <a:graphic>
-          <a:graphicData uri="http://schemas.openxmlformats.org/presentationml/2006/ole">
-            <p:oleObj spid="_x0000_s15370" name="Equation" r:id="rId11" imgW="164880" imgH="228600" progId="Equation.DSMT4">
-              <p:embed/>
-            </p:oleObj>
-          </a:graphicData>
-        </a:graphic>
-      </p:graphicFrame>
-      <p:cxnSp>
-        <p:nvCxnSpPr>
-          <p:cNvPr id="47" name="Straight Connector 46"/>
-          <p:cNvCxnSpPr>
-            <a:endCxn id="16" idx="4"/>
-          </p:cNvCxnSpPr>
-          <p:nvPr/>
-        </p:nvCxnSpPr>
-        <p:spPr>
-          <a:xfrm flipV="1">
-            <a:off x="4462463" y="3467100"/>
-            <a:ext cx="9525" cy="871538"/>
-          </a:xfrm>
-          <a:prstGeom prst="line">
-            <a:avLst/>
-          </a:prstGeom>
-          <a:ln w="15875">
-            <a:solidFill>
-              <a:schemeClr val="tx1"/>
-            </a:solidFill>
-            <a:headEnd type="stealth"/>
-            <a:tailEnd type="none"/>
-          </a:ln>
-        </p:spPr>
-        <p:style>
-          <a:lnRef idx="1">
-            <a:schemeClr val="accent1"/>
-          </a:lnRef>
-          <a:fillRef idx="0">
-            <a:schemeClr val="accent1"/>
-          </a:fillRef>
-          <a:effectRef idx="0">
-            <a:schemeClr val="accent1"/>
-          </a:effectRef>
-          <a:fontRef idx="minor">
-            <a:schemeClr val="tx1"/>
-          </a:fontRef>
-        </p:style>
-      </p:cxnSp>
-      <p:graphicFrame>
-        <p:nvGraphicFramePr>
-          <p:cNvPr id="15371" name="Object 11"/>
-          <p:cNvGraphicFramePr>
-            <a:graphicFrameLocks noChangeAspect="1"/>
-          </p:cNvGraphicFramePr>
-          <p:nvPr/>
-        </p:nvGraphicFramePr>
-        <p:xfrm>
-          <a:off x="4240213" y="4138613"/>
-          <a:ext cx="177800" cy="228600"/>
-        </p:xfrm>
-        <a:graphic>
-          <a:graphicData uri="http://schemas.openxmlformats.org/presentationml/2006/ole">
-            <p:oleObj spid="_x0000_s15371" name="Equation" r:id="rId12" imgW="177480" imgH="228600" progId="Equation.DSMT4">
-              <p:embed/>
-            </p:oleObj>
-          </a:graphicData>
-        </a:graphic>
-      </p:graphicFrame>
-      <p:cxnSp>
-        <p:nvCxnSpPr>
-          <p:cNvPr id="55" name="Straight Connector 54"/>
-          <p:cNvCxnSpPr/>
-          <p:nvPr/>
-        </p:nvCxnSpPr>
-        <p:spPr>
-          <a:xfrm flipH="1">
-            <a:off x="2544909" y="3436791"/>
-            <a:ext cx="384029" cy="0"/>
-          </a:xfrm>
-          <a:prstGeom prst="line">
-            <a:avLst/>
-          </a:prstGeom>
-          <a:ln w="25400">
-            <a:solidFill>
-              <a:schemeClr val="tx1"/>
-            </a:solidFill>
-            <a:headEnd type="stealth"/>
-            <a:tailEnd type="none"/>
-          </a:ln>
-        </p:spPr>
-        <p:style>
-          <a:lnRef idx="1">
-            <a:schemeClr val="accent1"/>
-          </a:lnRef>
-          <a:fillRef idx="0">
-            <a:schemeClr val="accent1"/>
-          </a:fillRef>
-          <a:effectRef idx="0">
-            <a:schemeClr val="accent1"/>
-          </a:effectRef>
-          <a:fontRef idx="minor">
-            <a:schemeClr val="tx1"/>
-          </a:fontRef>
-        </p:style>
-      </p:cxnSp>
-      <p:graphicFrame>
-        <p:nvGraphicFramePr>
-          <p:cNvPr id="15372" name="Object 12"/>
-          <p:cNvGraphicFramePr>
-            <a:graphicFrameLocks noChangeAspect="1"/>
-          </p:cNvGraphicFramePr>
-          <p:nvPr/>
-        </p:nvGraphicFramePr>
-        <p:xfrm>
-          <a:off x="2625725" y="3171825"/>
-          <a:ext cx="215900" cy="228600"/>
-        </p:xfrm>
-        <a:graphic>
-          <a:graphicData uri="http://schemas.openxmlformats.org/presentationml/2006/ole">
-            <p:oleObj spid="_x0000_s15372" name="Equation" r:id="rId13" imgW="215640" imgH="228600" progId="Equation.DSMT4">
-              <p:embed/>
-            </p:oleObj>
-          </a:graphicData>
-        </a:graphic>
-      </p:graphicFrame>
-      <p:cxnSp>
-        <p:nvCxnSpPr>
-          <p:cNvPr id="63" name="Straight Connector 62"/>
-          <p:cNvCxnSpPr/>
-          <p:nvPr/>
-        </p:nvCxnSpPr>
-        <p:spPr>
-          <a:xfrm flipV="1">
-            <a:off x="3703396" y="3183084"/>
-            <a:ext cx="223933" cy="512616"/>
-          </a:xfrm>
-          <a:prstGeom prst="line">
-            <a:avLst/>
-          </a:prstGeom>
-          <a:ln w="9525">
-            <a:solidFill>
-              <a:schemeClr val="tx1"/>
-            </a:solidFill>
-            <a:headEnd type="none"/>
-            <a:tailEnd type="none"/>
-          </a:ln>
-        </p:spPr>
-        <p:style>
-          <a:lnRef idx="1">
-            <a:schemeClr val="accent1"/>
-          </a:lnRef>
-          <a:fillRef idx="0">
-            <a:schemeClr val="accent1"/>
-          </a:fillRef>
-          <a:effectRef idx="0">
-            <a:schemeClr val="accent1"/>
-          </a:effectRef>
-          <a:fontRef idx="minor">
-            <a:schemeClr val="tx1"/>
-          </a:fontRef>
-        </p:style>
-      </p:cxnSp>
-      <p:cxnSp>
-        <p:nvCxnSpPr>
-          <p:cNvPr id="65" name="Straight Connector 64"/>
-          <p:cNvCxnSpPr/>
-          <p:nvPr/>
-        </p:nvCxnSpPr>
-        <p:spPr>
-          <a:xfrm flipV="1">
-            <a:off x="5846521" y="4121297"/>
-            <a:ext cx="223933" cy="512616"/>
-          </a:xfrm>
-          <a:prstGeom prst="line">
-            <a:avLst/>
-          </a:prstGeom>
-          <a:ln w="9525">
-            <a:solidFill>
-              <a:schemeClr val="tx1"/>
-            </a:solidFill>
-            <a:headEnd type="none"/>
-            <a:tailEnd type="none"/>
-          </a:ln>
-        </p:spPr>
-        <p:style>
-          <a:lnRef idx="1">
-            <a:schemeClr val="accent1"/>
-          </a:lnRef>
-          <a:fillRef idx="0">
-            <a:schemeClr val="accent1"/>
-          </a:fillRef>
-          <a:effectRef idx="0">
-            <a:schemeClr val="accent1"/>
-          </a:effectRef>
-          <a:fontRef idx="minor">
-            <a:schemeClr val="tx1"/>
-          </a:fontRef>
-        </p:style>
-      </p:cxnSp>
-      <p:cxnSp>
-        <p:nvCxnSpPr>
-          <p:cNvPr id="66" name="Straight Connector 65"/>
-          <p:cNvCxnSpPr/>
-          <p:nvPr/>
-        </p:nvCxnSpPr>
-        <p:spPr>
-          <a:xfrm>
-            <a:off x="3733800" y="3609975"/>
-            <a:ext cx="2138363" cy="942976"/>
-          </a:xfrm>
-          <a:prstGeom prst="line">
-            <a:avLst/>
-          </a:prstGeom>
-          <a:ln w="9525">
-            <a:solidFill>
-              <a:schemeClr val="tx1"/>
-            </a:solidFill>
-            <a:headEnd type="stealth" w="sm" len="med"/>
-            <a:tailEnd type="stealth" w="sm" len="med"/>
-          </a:ln>
-        </p:spPr>
-        <p:style>
-          <a:lnRef idx="1">
-            <a:schemeClr val="accent1"/>
-          </a:lnRef>
-          <a:fillRef idx="0">
-            <a:schemeClr val="accent1"/>
-          </a:fillRef>
-          <a:effectRef idx="0">
-            <a:schemeClr val="accent1"/>
-          </a:effectRef>
-          <a:fontRef idx="minor">
-            <a:schemeClr val="tx1"/>
-          </a:fontRef>
-        </p:style>
-      </p:cxnSp>
-      <p:cxnSp>
-        <p:nvCxnSpPr>
-          <p:cNvPr id="69" name="Straight Connector 68"/>
-          <p:cNvCxnSpPr/>
-          <p:nvPr/>
-        </p:nvCxnSpPr>
-        <p:spPr>
-          <a:xfrm>
-            <a:off x="3719512" y="3667124"/>
-            <a:ext cx="523876" cy="233363"/>
-          </a:xfrm>
-          <a:prstGeom prst="line">
-            <a:avLst/>
-          </a:prstGeom>
-          <a:ln w="9525">
-            <a:solidFill>
-              <a:schemeClr val="tx1"/>
-            </a:solidFill>
-            <a:headEnd type="stealth" w="sm" len="med"/>
-            <a:tailEnd type="stealth" w="sm" len="med"/>
-          </a:ln>
-        </p:spPr>
-        <p:style>
-          <a:lnRef idx="1">
-            <a:schemeClr val="accent1"/>
-          </a:lnRef>
-          <a:fillRef idx="0">
-            <a:schemeClr val="accent1"/>
-          </a:fillRef>
-          <a:effectRef idx="0">
-            <a:schemeClr val="accent1"/>
-          </a:effectRef>
-          <a:fontRef idx="minor">
-            <a:schemeClr val="tx1"/>
-          </a:fontRef>
-        </p:style>
-      </p:cxnSp>
-      <p:graphicFrame>
-        <p:nvGraphicFramePr>
-          <p:cNvPr id="15373" name="Object 13"/>
-          <p:cNvGraphicFramePr>
-            <a:graphicFrameLocks noChangeAspect="1"/>
-          </p:cNvGraphicFramePr>
-          <p:nvPr/>
-        </p:nvGraphicFramePr>
-        <p:xfrm>
-          <a:off x="4976813" y="4225925"/>
-          <a:ext cx="114300" cy="139700"/>
-        </p:xfrm>
-        <a:graphic>
-          <a:graphicData uri="http://schemas.openxmlformats.org/presentationml/2006/ole">
-            <p:oleObj spid="_x0000_s15373" name="Equation" r:id="rId14" imgW="114120" imgH="139680" progId="Equation.DSMT4">
-              <p:embed/>
-            </p:oleObj>
-          </a:graphicData>
-        </a:graphic>
-      </p:graphicFrame>
-      <p:graphicFrame>
-        <p:nvGraphicFramePr>
-          <p:cNvPr id="15374" name="Object 14"/>
-          <p:cNvGraphicFramePr>
-            <a:graphicFrameLocks noChangeAspect="1"/>
-          </p:cNvGraphicFramePr>
-          <p:nvPr/>
-        </p:nvGraphicFramePr>
-        <p:xfrm>
-          <a:off x="3735388" y="3735389"/>
-          <a:ext cx="254000" cy="215900"/>
-        </p:xfrm>
-        <a:graphic>
-          <a:graphicData uri="http://schemas.openxmlformats.org/presentationml/2006/ole">
-            <p:oleObj spid="_x0000_s15374" name="Equation" r:id="rId15" imgW="253800" imgH="215640" progId="Equation.DSMT4">
-              <p:embed/>
-            </p:oleObj>
-          </a:graphicData>
-        </a:graphic>
-      </p:graphicFrame>
-    </p:spTree>
-  </p:cSld>
-  <p:clrMapOvr>
-    <a:masterClrMapping/>
-  </p:clrMapOvr>
-  <p:timing>
-    <p:tnLst>
-      <p:par>
-        <p:cTn id="1" dur="indefinite" restart="never" nodeType="tmRoot"/>
-      </p:par>
-    </p:tnLst>
-  </p:timing>
-</p:sld>
-</file>
-
-<file path=ppt/slides/slide2.xml><?xml version="1.0" encoding="utf-8"?>
 <p:sld xmlns:a="http://schemas.openxmlformats.org/drawingml/2006/main" xmlns:r="http://schemas.openxmlformats.org/officeDocument/2006/relationships" xmlns:p="http://schemas.openxmlformats.org/presentationml/2006/main">
   <p:cSld>
     <p:spTree>

</xml_diff>

<commit_message>
Bold face applied to all vectors Corrected figures Deleted small angles approximation of the R_dot
</commit_message>
<xml_diff>
--- a/Springer_UAV_book/Pictures/Fig10.pptx
+++ b/Springer_UAV_book/Pictures/Fig10.pptx
@@ -289,7 +289,7 @@
             <a:fld id="{CC7BA875-E63D-46CD-9D74-6CBD955FEC8C}" type="datetimeFigureOut">
               <a:rPr lang="en-US" smtClean="0"/>
               <a:pPr/>
-              <a:t>4/16/2012</a:t>
+              <a:t>7/30/2012</a:t>
             </a:fld>
             <a:endParaRPr lang="en-US"/>
           </a:p>
@@ -456,7 +456,7 @@
             <a:fld id="{CC7BA875-E63D-46CD-9D74-6CBD955FEC8C}" type="datetimeFigureOut">
               <a:rPr lang="en-US" smtClean="0"/>
               <a:pPr/>
-              <a:t>4/16/2012</a:t>
+              <a:t>7/30/2012</a:t>
             </a:fld>
             <a:endParaRPr lang="en-US"/>
           </a:p>
@@ -633,7 +633,7 @@
             <a:fld id="{CC7BA875-E63D-46CD-9D74-6CBD955FEC8C}" type="datetimeFigureOut">
               <a:rPr lang="en-US" smtClean="0"/>
               <a:pPr/>
-              <a:t>4/16/2012</a:t>
+              <a:t>7/30/2012</a:t>
             </a:fld>
             <a:endParaRPr lang="en-US"/>
           </a:p>
@@ -800,7 +800,7 @@
             <a:fld id="{CC7BA875-E63D-46CD-9D74-6CBD955FEC8C}" type="datetimeFigureOut">
               <a:rPr lang="en-US" smtClean="0"/>
               <a:pPr/>
-              <a:t>4/16/2012</a:t>
+              <a:t>7/30/2012</a:t>
             </a:fld>
             <a:endParaRPr lang="en-US"/>
           </a:p>
@@ -1043,7 +1043,7 @@
             <a:fld id="{CC7BA875-E63D-46CD-9D74-6CBD955FEC8C}" type="datetimeFigureOut">
               <a:rPr lang="en-US" smtClean="0"/>
               <a:pPr/>
-              <a:t>4/16/2012</a:t>
+              <a:t>7/30/2012</a:t>
             </a:fld>
             <a:endParaRPr lang="en-US"/>
           </a:p>
@@ -1328,7 +1328,7 @@
             <a:fld id="{CC7BA875-E63D-46CD-9D74-6CBD955FEC8C}" type="datetimeFigureOut">
               <a:rPr lang="en-US" smtClean="0"/>
               <a:pPr/>
-              <a:t>4/16/2012</a:t>
+              <a:t>7/30/2012</a:t>
             </a:fld>
             <a:endParaRPr lang="en-US"/>
           </a:p>
@@ -1747,7 +1747,7 @@
             <a:fld id="{CC7BA875-E63D-46CD-9D74-6CBD955FEC8C}" type="datetimeFigureOut">
               <a:rPr lang="en-US" smtClean="0"/>
               <a:pPr/>
-              <a:t>4/16/2012</a:t>
+              <a:t>7/30/2012</a:t>
             </a:fld>
             <a:endParaRPr lang="en-US"/>
           </a:p>
@@ -1862,7 +1862,7 @@
             <a:fld id="{CC7BA875-E63D-46CD-9D74-6CBD955FEC8C}" type="datetimeFigureOut">
               <a:rPr lang="en-US" smtClean="0"/>
               <a:pPr/>
-              <a:t>4/16/2012</a:t>
+              <a:t>7/30/2012</a:t>
             </a:fld>
             <a:endParaRPr lang="en-US"/>
           </a:p>
@@ -1954,7 +1954,7 @@
             <a:fld id="{CC7BA875-E63D-46CD-9D74-6CBD955FEC8C}" type="datetimeFigureOut">
               <a:rPr lang="en-US" smtClean="0"/>
               <a:pPr/>
-              <a:t>4/16/2012</a:t>
+              <a:t>7/30/2012</a:t>
             </a:fld>
             <a:endParaRPr lang="en-US"/>
           </a:p>
@@ -2228,7 +2228,7 @@
             <a:fld id="{CC7BA875-E63D-46CD-9D74-6CBD955FEC8C}" type="datetimeFigureOut">
               <a:rPr lang="en-US" smtClean="0"/>
               <a:pPr/>
-              <a:t>4/16/2012</a:t>
+              <a:t>7/30/2012</a:t>
             </a:fld>
             <a:endParaRPr lang="en-US"/>
           </a:p>
@@ -2478,7 +2478,7 @@
             <a:fld id="{CC7BA875-E63D-46CD-9D74-6CBD955FEC8C}" type="datetimeFigureOut">
               <a:rPr lang="en-US" smtClean="0"/>
               <a:pPr/>
-              <a:t>4/16/2012</a:t>
+              <a:t>7/30/2012</a:t>
             </a:fld>
             <a:endParaRPr lang="en-US"/>
           </a:p>
@@ -2688,7 +2688,7 @@
             <a:fld id="{CC7BA875-E63D-46CD-9D74-6CBD955FEC8C}" type="datetimeFigureOut">
               <a:rPr lang="en-US" smtClean="0"/>
               <a:pPr/>
-              <a:t>4/16/2012</a:t>
+              <a:t>7/30/2012</a:t>
             </a:fld>
             <a:endParaRPr lang="en-US"/>
           </a:p>
@@ -3735,12 +3735,12 @@
           <p:nvPr/>
         </p:nvGraphicFramePr>
         <p:xfrm>
-          <a:off x="5172075" y="2533650"/>
-          <a:ext cx="190500" cy="228600"/>
+          <a:off x="5178425" y="2533650"/>
+          <a:ext cx="177800" cy="228600"/>
         </p:xfrm>
         <a:graphic>
           <a:graphicData uri="http://schemas.openxmlformats.org/presentationml/2006/ole">
-            <p:oleObj spid="_x0000_s16390" name="Equation" r:id="rId7" imgW="190440" imgH="228600" progId="Equation.DSMT4">
+            <p:oleObj spid="_x0000_s16390" name="Equation" r:id="rId7" imgW="177480" imgH="228600" progId="Equation.DSMT4">
               <p:embed/>
             </p:oleObj>
           </a:graphicData>
@@ -4006,12 +4006,12 @@
           <p:nvPr/>
         </p:nvGraphicFramePr>
         <p:xfrm>
-          <a:off x="4521200" y="2786063"/>
-          <a:ext cx="254000" cy="228600"/>
+          <a:off x="4514850" y="2786063"/>
+          <a:ext cx="266700" cy="228600"/>
         </p:xfrm>
         <a:graphic>
           <a:graphicData uri="http://schemas.openxmlformats.org/presentationml/2006/ole">
-            <p:oleObj spid="_x0000_s16393" name="Equation" r:id="rId10" imgW="253800" imgH="228600" progId="Equation.DSMT4">
+            <p:oleObj spid="_x0000_s16393" name="Equation" r:id="rId10" imgW="266400" imgH="228600" progId="Equation.DSMT4">
               <p:embed/>
             </p:oleObj>
           </a:graphicData>

</xml_diff>

<commit_message>
Complete redefinition of vectors and rotations denoting the frame where the vector is resolved. Adding  "DynamicsOfRotations_Stanford" to the area review.
</commit_message>
<xml_diff>
--- a/Springer_UAV_book/Pictures/Fig10.pptx
+++ b/Springer_UAV_book/Pictures/Fig10.pptx
@@ -289,7 +289,7 @@
             <a:fld id="{CC7BA875-E63D-46CD-9D74-6CBD955FEC8C}" type="datetimeFigureOut">
               <a:rPr lang="en-US" smtClean="0"/>
               <a:pPr/>
-              <a:t>7/30/2012</a:t>
+              <a:t>8/7/2012</a:t>
             </a:fld>
             <a:endParaRPr lang="en-US"/>
           </a:p>
@@ -456,7 +456,7 @@
             <a:fld id="{CC7BA875-E63D-46CD-9D74-6CBD955FEC8C}" type="datetimeFigureOut">
               <a:rPr lang="en-US" smtClean="0"/>
               <a:pPr/>
-              <a:t>7/30/2012</a:t>
+              <a:t>8/7/2012</a:t>
             </a:fld>
             <a:endParaRPr lang="en-US"/>
           </a:p>
@@ -633,7 +633,7 @@
             <a:fld id="{CC7BA875-E63D-46CD-9D74-6CBD955FEC8C}" type="datetimeFigureOut">
               <a:rPr lang="en-US" smtClean="0"/>
               <a:pPr/>
-              <a:t>7/30/2012</a:t>
+              <a:t>8/7/2012</a:t>
             </a:fld>
             <a:endParaRPr lang="en-US"/>
           </a:p>
@@ -800,7 +800,7 @@
             <a:fld id="{CC7BA875-E63D-46CD-9D74-6CBD955FEC8C}" type="datetimeFigureOut">
               <a:rPr lang="en-US" smtClean="0"/>
               <a:pPr/>
-              <a:t>7/30/2012</a:t>
+              <a:t>8/7/2012</a:t>
             </a:fld>
             <a:endParaRPr lang="en-US"/>
           </a:p>
@@ -1043,7 +1043,7 @@
             <a:fld id="{CC7BA875-E63D-46CD-9D74-6CBD955FEC8C}" type="datetimeFigureOut">
               <a:rPr lang="en-US" smtClean="0"/>
               <a:pPr/>
-              <a:t>7/30/2012</a:t>
+              <a:t>8/7/2012</a:t>
             </a:fld>
             <a:endParaRPr lang="en-US"/>
           </a:p>
@@ -1328,7 +1328,7 @@
             <a:fld id="{CC7BA875-E63D-46CD-9D74-6CBD955FEC8C}" type="datetimeFigureOut">
               <a:rPr lang="en-US" smtClean="0"/>
               <a:pPr/>
-              <a:t>7/30/2012</a:t>
+              <a:t>8/7/2012</a:t>
             </a:fld>
             <a:endParaRPr lang="en-US"/>
           </a:p>
@@ -1747,7 +1747,7 @@
             <a:fld id="{CC7BA875-E63D-46CD-9D74-6CBD955FEC8C}" type="datetimeFigureOut">
               <a:rPr lang="en-US" smtClean="0"/>
               <a:pPr/>
-              <a:t>7/30/2012</a:t>
+              <a:t>8/7/2012</a:t>
             </a:fld>
             <a:endParaRPr lang="en-US"/>
           </a:p>
@@ -1862,7 +1862,7 @@
             <a:fld id="{CC7BA875-E63D-46CD-9D74-6CBD955FEC8C}" type="datetimeFigureOut">
               <a:rPr lang="en-US" smtClean="0"/>
               <a:pPr/>
-              <a:t>7/30/2012</a:t>
+              <a:t>8/7/2012</a:t>
             </a:fld>
             <a:endParaRPr lang="en-US"/>
           </a:p>
@@ -1954,7 +1954,7 @@
             <a:fld id="{CC7BA875-E63D-46CD-9D74-6CBD955FEC8C}" type="datetimeFigureOut">
               <a:rPr lang="en-US" smtClean="0"/>
               <a:pPr/>
-              <a:t>7/30/2012</a:t>
+              <a:t>8/7/2012</a:t>
             </a:fld>
             <a:endParaRPr lang="en-US"/>
           </a:p>
@@ -2228,7 +2228,7 @@
             <a:fld id="{CC7BA875-E63D-46CD-9D74-6CBD955FEC8C}" type="datetimeFigureOut">
               <a:rPr lang="en-US" smtClean="0"/>
               <a:pPr/>
-              <a:t>7/30/2012</a:t>
+              <a:t>8/7/2012</a:t>
             </a:fld>
             <a:endParaRPr lang="en-US"/>
           </a:p>
@@ -2478,7 +2478,7 @@
             <a:fld id="{CC7BA875-E63D-46CD-9D74-6CBD955FEC8C}" type="datetimeFigureOut">
               <a:rPr lang="en-US" smtClean="0"/>
               <a:pPr/>
-              <a:t>7/30/2012</a:t>
+              <a:t>8/7/2012</a:t>
             </a:fld>
             <a:endParaRPr lang="en-US"/>
           </a:p>
@@ -2688,7 +2688,7 @@
             <a:fld id="{CC7BA875-E63D-46CD-9D74-6CBD955FEC8C}" type="datetimeFigureOut">
               <a:rPr lang="en-US" smtClean="0"/>
               <a:pPr/>
-              <a:t>7/30/2012</a:t>
+              <a:t>8/7/2012</a:t>
             </a:fld>
             <a:endParaRPr lang="en-US"/>
           </a:p>
@@ -3690,14 +3690,12 @@
       <p:cxnSp>
         <p:nvCxnSpPr>
           <p:cNvPr id="21" name="Straight Connector 20"/>
-          <p:cNvCxnSpPr>
-            <a:endCxn id="16" idx="3"/>
-          </p:cNvCxnSpPr>
+          <p:cNvCxnSpPr/>
           <p:nvPr/>
         </p:nvCxnSpPr>
         <p:spPr>
           <a:xfrm flipV="1">
-            <a:off x="4080435" y="3454546"/>
+            <a:off x="4089961" y="3464072"/>
             <a:ext cx="361244" cy="826942"/>
           </a:xfrm>
           <a:prstGeom prst="line">
@@ -3735,12 +3733,12 @@
           <p:nvPr/>
         </p:nvGraphicFramePr>
         <p:xfrm>
-          <a:off x="5178425" y="2533650"/>
-          <a:ext cx="177800" cy="228600"/>
+          <a:off x="5165725" y="2527300"/>
+          <a:ext cx="203200" cy="241300"/>
         </p:xfrm>
         <a:graphic>
           <a:graphicData uri="http://schemas.openxmlformats.org/presentationml/2006/ole">
-            <p:oleObj spid="_x0000_s16390" name="Equation" r:id="rId7" imgW="177480" imgH="228600" progId="Equation.DSMT4">
+            <p:oleObj spid="_x0000_s16390" name="Equation" r:id="rId7" imgW="203040" imgH="241200" progId="Equation.DSMT4">
               <p:embed/>
             </p:oleObj>
           </a:graphicData>
@@ -4006,12 +4004,12 @@
           <p:nvPr/>
         </p:nvGraphicFramePr>
         <p:xfrm>
-          <a:off x="4514850" y="2786063"/>
-          <a:ext cx="266700" cy="228600"/>
+          <a:off x="4521200" y="2779713"/>
+          <a:ext cx="254000" cy="241300"/>
         </p:xfrm>
         <a:graphic>
           <a:graphicData uri="http://schemas.openxmlformats.org/presentationml/2006/ole">
-            <p:oleObj spid="_x0000_s16393" name="Equation" r:id="rId10" imgW="266400" imgH="228600" progId="Equation.DSMT4">
+            <p:oleObj spid="_x0000_s16393" name="Equation" r:id="rId10" imgW="253800" imgH="241200" progId="Equation.DSMT4">
               <p:embed/>
             </p:oleObj>
           </a:graphicData>
@@ -4600,6 +4598,7 @@
             <a:solidFill>
               <a:schemeClr val="tx1"/>
             </a:solidFill>
+            <a:prstDash val="dash"/>
             <a:headEnd type="none" w="sm" len="med"/>
             <a:tailEnd type="none" w="sm" len="med"/>
           </a:ln>
@@ -4639,6 +4638,82 @@
           </a:graphicData>
         </a:graphic>
       </p:graphicFrame>
+      <p:cxnSp>
+        <p:nvCxnSpPr>
+          <p:cNvPr id="42" name="Straight Connector 41"/>
+          <p:cNvCxnSpPr/>
+          <p:nvPr/>
+        </p:nvCxnSpPr>
+        <p:spPr>
+          <a:xfrm>
+            <a:off x="6057900" y="3895725"/>
+            <a:ext cx="119063" cy="85725"/>
+          </a:xfrm>
+          <a:prstGeom prst="line">
+            <a:avLst/>
+          </a:prstGeom>
+          <a:ln w="9525">
+            <a:solidFill>
+              <a:schemeClr val="tx1"/>
+            </a:solidFill>
+            <a:prstDash val="dash"/>
+            <a:headEnd type="none" w="sm" len="med"/>
+            <a:tailEnd type="none" w="sm" len="med"/>
+          </a:ln>
+        </p:spPr>
+        <p:style>
+          <a:lnRef idx="1">
+            <a:schemeClr val="accent1"/>
+          </a:lnRef>
+          <a:fillRef idx="0">
+            <a:schemeClr val="accent1"/>
+          </a:fillRef>
+          <a:effectRef idx="0">
+            <a:schemeClr val="accent1"/>
+          </a:effectRef>
+          <a:fontRef idx="minor">
+            <a:schemeClr val="tx1"/>
+          </a:fontRef>
+        </p:style>
+      </p:cxnSp>
+      <p:cxnSp>
+        <p:nvCxnSpPr>
+          <p:cNvPr id="49" name="Straight Connector 48"/>
+          <p:cNvCxnSpPr/>
+          <p:nvPr/>
+        </p:nvCxnSpPr>
+        <p:spPr>
+          <a:xfrm>
+            <a:off x="6419850" y="3509962"/>
+            <a:ext cx="119063" cy="85725"/>
+          </a:xfrm>
+          <a:prstGeom prst="line">
+            <a:avLst/>
+          </a:prstGeom>
+          <a:ln w="9525">
+            <a:solidFill>
+              <a:schemeClr val="tx1"/>
+            </a:solidFill>
+            <a:prstDash val="dash"/>
+            <a:headEnd type="none" w="sm" len="med"/>
+            <a:tailEnd type="none" w="sm" len="med"/>
+          </a:ln>
+        </p:spPr>
+        <p:style>
+          <a:lnRef idx="1">
+            <a:schemeClr val="accent1"/>
+          </a:lnRef>
+          <a:fillRef idx="0">
+            <a:schemeClr val="accent1"/>
+          </a:fillRef>
+          <a:effectRef idx="0">
+            <a:schemeClr val="accent1"/>
+          </a:effectRef>
+          <a:fontRef idx="minor">
+            <a:schemeClr val="tx1"/>
+          </a:fontRef>
+        </p:style>
+      </p:cxnSp>
     </p:spTree>
   </p:cSld>
   <p:clrMapOvr>

</xml_diff>